<commit_message>
updates to the ppt
</commit_message>
<xml_diff>
--- a/Personal podcast generator.pptx
+++ b/Personal podcast generator.pptx
@@ -9322,9 +9322,6 @@
           <a:off x="6340210" y="0"/>
           <a:ext cx="1311010" cy="728360"/>
         </a:xfrm>
-        <a:prstGeom prst="rect">
-          <a:avLst/>
-        </a:prstGeom>
         <a:solidFill>
           <a:schemeClr val="tx1">
             <a:lumMod val="75000"/>
@@ -9509,9 +9506,6 @@
           <a:off x="5029199" y="105866"/>
           <a:ext cx="1311010" cy="624419"/>
         </a:xfrm>
-        <a:prstGeom prst="rect">
-          <a:avLst/>
-        </a:prstGeom>
         <a:solidFill>
           <a:schemeClr val="tx1">
             <a:lumMod val="75000"/>
@@ -9678,9 +9672,6 @@
           <a:off x="3718189" y="208268"/>
           <a:ext cx="1311010" cy="520092"/>
         </a:xfrm>
-        <a:prstGeom prst="rect">
-          <a:avLst/>
-        </a:prstGeom>
         <a:solidFill>
           <a:schemeClr val="tx1">
             <a:lumMod val="75000"/>
@@ -9847,9 +9838,6 @@
           <a:off x="2407178" y="312209"/>
           <a:ext cx="1311010" cy="416151"/>
         </a:xfrm>
-        <a:prstGeom prst="rect">
-          <a:avLst/>
-        </a:prstGeom>
         <a:solidFill>
           <a:schemeClr val="tx1">
             <a:lumMod val="75000"/>
@@ -11035,9 +11023,6 @@
           <a:off x="682968" y="842696"/>
           <a:ext cx="3850187" cy="3002755"/>
         </a:xfrm>
-        <a:prstGeom prst="rect">
-          <a:avLst/>
-        </a:prstGeom>
         <a:gradFill flip="none" rotWithShape="0">
           <a:gsLst>
             <a:gs pos="0">
@@ -11288,9 +11273,6 @@
           <a:off x="6208212" y="846931"/>
           <a:ext cx="3850187" cy="3002755"/>
         </a:xfrm>
-        <a:prstGeom prst="rect">
-          <a:avLst/>
-        </a:prstGeom>
         <a:gradFill flip="none" rotWithShape="0">
           <a:gsLst>
             <a:gs pos="0">
@@ -11457,9 +11439,6 @@
           <a:off x="3218687" y="2343"/>
           <a:ext cx="3621024" cy="1127089"/>
         </a:xfrm>
-        <a:prstGeom prst="roundRect">
-          <a:avLst/>
-        </a:prstGeom>
         <a:gradFill flip="none" rotWithShape="0">
           <a:gsLst>
             <a:gs pos="0">
@@ -11557,9 +11536,6 @@
           <a:off x="3218687" y="1185787"/>
           <a:ext cx="3621024" cy="1127089"/>
         </a:xfrm>
-        <a:prstGeom prst="roundRect">
-          <a:avLst/>
-        </a:prstGeom>
         <a:gradFill flip="none" rotWithShape="0">
           <a:gsLst>
             <a:gs pos="0">
@@ -11660,9 +11636,6 @@
           <a:off x="3218687" y="2369231"/>
           <a:ext cx="3621024" cy="1127089"/>
         </a:xfrm>
-        <a:prstGeom prst="roundRect">
-          <a:avLst/>
-        </a:prstGeom>
         <a:gradFill flip="none" rotWithShape="0">
           <a:gsLst>
             <a:gs pos="0">
@@ -11760,9 +11733,6 @@
           <a:off x="3218687" y="3552675"/>
           <a:ext cx="3621024" cy="1127089"/>
         </a:xfrm>
-        <a:prstGeom prst="roundRect">
-          <a:avLst/>
-        </a:prstGeom>
         <a:gradFill flip="none" rotWithShape="0">
           <a:gsLst>
             <a:gs pos="0">
@@ -26585,6 +26555,20 @@
             </a:r>
           </a:p>
           <a:p>
+            <a:r>
+              <a:rPr lang="en-IN" dirty="0"/>
+              <a:t>Functionality to automate the upload of created audio as podcasts, on Spotify. (</a:t>
+            </a:r>
+            <a:r>
+              <a:rPr lang="en-IN" b="1" dirty="0"/>
+              <a:t>Automated content creation</a:t>
+            </a:r>
+            <a:r>
+              <a:rPr lang="en-IN" dirty="0"/>
+              <a:t>)</a:t>
+            </a:r>
+          </a:p>
+          <a:p>
             <a:endParaRPr lang="en-IN" dirty="0"/>
           </a:p>
           <a:p>
@@ -27222,6 +27206,15 @@
 </file>
 
 <file path=customXml/item2.xml><?xml version="1.0" encoding="utf-8"?>
+<?mso-contentType ?>
+<FormTemplates xmlns="http://schemas.microsoft.com/sharepoint/v3/contenttype/forms">
+  <Display>DocumentLibraryForm</Display>
+  <Edit>DocumentLibraryForm</Edit>
+  <New>DocumentLibraryForm</New>
+</FormTemplates>
+</file>
+
+<file path=customXml/item3.xml><?xml version="1.0" encoding="utf-8"?>
 <ct:contentTypeSchema xmlns:ct="http://schemas.microsoft.com/office/2006/metadata/contentType" xmlns:ma="http://schemas.microsoft.com/office/2006/metadata/properties/metaAttributes" ct:_="" ma:_="" ma:contentTypeName="Document" ma:contentTypeID="0x01010079F111ED35F8CC479449609E8A0923A6" ma:contentTypeVersion="12" ma:contentTypeDescription="Create a new document." ma:contentTypeScope="" ma:versionID="a410dd7f93c95333ffa1b60ed6adedd1">
   <xsd:schema xmlns:xsd="http://www.w3.org/2001/XMLSchema" xmlns:xs="http://www.w3.org/2001/XMLSchema" xmlns:p="http://schemas.microsoft.com/office/2006/metadata/properties" xmlns:ns2="71af3243-3dd4-4a8d-8c0d-dd76da1f02a5" xmlns:ns3="16c05727-aa75-4e4a-9b5f-8a80a1165891" targetNamespace="http://schemas.microsoft.com/office/2006/metadata/properties" ma:root="true" ma:fieldsID="a936d9baba76aa3866493feff160faab" ns2:_="" ns3:_="">
     <xsd:import namespace="71af3243-3dd4-4a8d-8c0d-dd76da1f02a5"/>
@@ -27442,15 +27435,6 @@
 </ct:contentTypeSchema>
 </file>
 
-<file path=customXml/item3.xml><?xml version="1.0" encoding="utf-8"?>
-<?mso-contentType ?>
-<FormTemplates xmlns="http://schemas.microsoft.com/sharepoint/v3/contenttype/forms">
-  <Display>DocumentLibraryForm</Display>
-  <Edit>DocumentLibraryForm</Edit>
-  <New>DocumentLibraryForm</New>
-</FormTemplates>
-</file>
-
 <file path=customXml/itemProps1.xml><?xml version="1.0" encoding="utf-8"?>
 <ds:datastoreItem xmlns:ds="http://schemas.openxmlformats.org/officeDocument/2006/customXml" ds:itemID="{B975FBC4-9D33-46BE-911D-419763BA9AF9}">
   <ds:schemaRefs>
@@ -27462,6 +27446,14 @@
 </file>
 
 <file path=customXml/itemProps2.xml><?xml version="1.0" encoding="utf-8"?>
+<ds:datastoreItem xmlns:ds="http://schemas.openxmlformats.org/officeDocument/2006/customXml" ds:itemID="{294F055B-D391-44D3-A87A-BCD07BD5A31C}">
+  <ds:schemaRefs>
+    <ds:schemaRef ds:uri="http://schemas.microsoft.com/sharepoint/v3/contenttype/forms"/>
+  </ds:schemaRefs>
+</ds:datastoreItem>
+</file>
+
+<file path=customXml/itemProps3.xml><?xml version="1.0" encoding="utf-8"?>
 <ds:datastoreItem xmlns:ds="http://schemas.openxmlformats.org/officeDocument/2006/customXml" ds:itemID="{26DBD101-FC0A-4B21-82B0-57CAA7AEEC71}">
   <ds:schemaRefs>
     <ds:schemaRef ds:uri="http://schemas.microsoft.com/office/2006/metadata/contentType"/>
@@ -27478,12 +27470,4 @@
     <ds:schemaRef ds:uri="http://schemas.microsoft.com/internal/obd"/>
   </ds:schemaRefs>
 </ds:datastoreItem>
-</file>
-
-<file path=customXml/itemProps3.xml><?xml version="1.0" encoding="utf-8"?>
-<ds:datastoreItem xmlns:ds="http://schemas.openxmlformats.org/officeDocument/2006/customXml" ds:itemID="{294F055B-D391-44D3-A87A-BCD07BD5A31C}">
-  <ds:schemaRefs>
-    <ds:schemaRef ds:uri="http://schemas.microsoft.com/sharepoint/v3/contenttype/forms"/>
-  </ds:schemaRefs>
-</ds:datastoreItem>
 </file>
</xml_diff>